<commit_message>
Render renders all references and images
</commit_message>
<xml_diff>
--- a/Media/Render/template.pptx
+++ b/Media/Render/template.pptx
@@ -221,7 +221,7 @@
           <a:p>
             <a:fld id="{E0C7647B-9B1A-4DBD-BE63-06ADB54748A3}" type="datetimeFigureOut">
               <a:rPr lang="en-GB" dirty="0"/>
-              <a:t>13/12/2021</a:t>
+              <a:t>14/12/2021</a:t>
             </a:fld>
             <a:endParaRPr lang="en-GB" dirty="0"/>
           </a:p>
@@ -641,7 +641,7 @@
           <a:p>
             <a:fld id="{8C6EEDE2-052F-4B33-9288-FE1B3863A324}" type="datetimeFigureOut">
               <a:rPr lang="en-GB" dirty="0"/>
-              <a:t>13/12/2021</a:t>
+              <a:t>14/12/2021</a:t>
             </a:fld>
             <a:endParaRPr lang="en-GB" dirty="0"/>
           </a:p>
@@ -838,7 +838,7 @@
           <a:p>
             <a:fld id="{8C6EEDE2-052F-4B33-9288-FE1B3863A324}" type="datetimeFigureOut">
               <a:rPr lang="en-GB" dirty="0"/>
-              <a:t>13/12/2021</a:t>
+              <a:t>14/12/2021</a:t>
             </a:fld>
             <a:endParaRPr lang="en-GB" dirty="0"/>
           </a:p>
@@ -1101,7 +1101,7 @@
           <a:p>
             <a:fld id="{8C6EEDE2-052F-4B33-9288-FE1B3863A324}" type="datetimeFigureOut">
               <a:rPr lang="en-GB" dirty="0"/>
-              <a:t>13/12/2021</a:t>
+              <a:t>14/12/2021</a:t>
             </a:fld>
             <a:endParaRPr lang="en-GB" dirty="0"/>
           </a:p>
@@ -1354,7 +1354,7 @@
           <a:p>
             <a:fld id="{8C6EEDE2-052F-4B33-9288-FE1B3863A324}" type="datetimeFigureOut">
               <a:rPr lang="en-GB" dirty="0"/>
-              <a:t>13/12/2021</a:t>
+              <a:t>14/12/2021</a:t>
             </a:fld>
             <a:endParaRPr lang="en-GB" dirty="0"/>
           </a:p>
@@ -1747,7 +1747,7 @@
           <a:p>
             <a:fld id="{8C6EEDE2-052F-4B33-9288-FE1B3863A324}" type="datetimeFigureOut">
               <a:rPr lang="en-GB" dirty="0"/>
-              <a:t>13/12/2021</a:t>
+              <a:t>14/12/2021</a:t>
             </a:fld>
             <a:endParaRPr lang="en-GB" dirty="0"/>
           </a:p>
@@ -1880,7 +1880,7 @@
           <a:p>
             <a:fld id="{8C6EEDE2-052F-4B33-9288-FE1B3863A324}" type="datetimeFigureOut">
               <a:rPr lang="en-GB" dirty="0"/>
-              <a:t>13/12/2021</a:t>
+              <a:t>14/12/2021</a:t>
             </a:fld>
             <a:endParaRPr lang="en-GB" dirty="0"/>
           </a:p>
@@ -1985,7 +1985,7 @@
           <a:p>
             <a:fld id="{8C6EEDE2-052F-4B33-9288-FE1B3863A324}" type="datetimeFigureOut">
               <a:rPr lang="en-GB" dirty="0"/>
-              <a:t>13/12/2021</a:t>
+              <a:t>14/12/2021</a:t>
             </a:fld>
             <a:endParaRPr lang="en-GB" dirty="0"/>
           </a:p>
@@ -2282,7 +2282,7 @@
           <a:p>
             <a:fld id="{8C6EEDE2-052F-4B33-9288-FE1B3863A324}" type="datetimeFigureOut">
               <a:rPr lang="en-GB" dirty="0"/>
-              <a:t>13/12/2021</a:t>
+              <a:t>14/12/2021</a:t>
             </a:fld>
             <a:endParaRPr lang="en-GB" dirty="0"/>
           </a:p>
@@ -2556,7 +2556,7 @@
           <a:p>
             <a:fld id="{8C6EEDE2-052F-4B33-9288-FE1B3863A324}" type="datetimeFigureOut">
               <a:rPr lang="en-GB" dirty="0"/>
-              <a:t>13/12/2021</a:t>
+              <a:t>14/12/2021</a:t>
             </a:fld>
             <a:endParaRPr lang="en-GB" dirty="0"/>
           </a:p>
@@ -2745,7 +2745,7 @@
           <a:p>
             <a:fld id="{8C6EEDE2-052F-4B33-9288-FE1B3863A324}" type="datetimeFigureOut">
               <a:rPr lang="en-GB" dirty="0"/>
-              <a:t>13/12/2021</a:t>
+              <a:t>14/12/2021</a:t>
             </a:fld>
             <a:endParaRPr lang="en-GB" dirty="0"/>
           </a:p>
@@ -2981,7 +2981,7 @@
           <a:p>
             <a:fld id="{8C6EEDE2-052F-4B33-9288-FE1B3863A324}" type="datetimeFigureOut">
               <a:rPr lang="en-GB" dirty="0"/>
-              <a:t>13/12/2021</a:t>
+              <a:t>14/12/2021</a:t>
             </a:fld>
             <a:endParaRPr lang="en-GB" dirty="0"/>
           </a:p>
@@ -4267,13 +4267,13 @@
   <p:clrMapOvr>
     <a:masterClrMapping/>
   </p:clrMapOvr>
-  <mc:AlternateContent xmlns:mc="http://schemas.openxmlformats.org/markup-compatibility/2006">
-    <mc:Choice xmlns:p14="http://schemas.microsoft.com/office/powerpoint/2010/main" Requires="p14">
+  <mc:AlternateContent xmlns:mc="http://schemas.openxmlformats.org/markup-compatibility/2006" xmlns:p14="http://schemas.microsoft.com/office/powerpoint/2010/main">
+    <mc:Choice Requires="p14">
       <p:transition spd="med" p14:dur="700" advClick="0" advTm="15000">
         <p:fade/>
       </p:transition>
     </mc:Choice>
-    <mc:Fallback>
+    <mc:Fallback xmlns="">
       <p:transition spd="med" advClick="0" advTm="15000">
         <p:fade/>
       </p:transition>
@@ -4754,151 +4754,141 @@
           </a:prstGeom>
         </p:spPr>
       </p:pic>
-      <p:pic>
-        <p:nvPicPr>
-          <p:cNvPr id="12" name="picture_tv">
+      <p:grpSp>
+        <p:nvGrpSpPr>
+          <p:cNvPr id="5" name="group_article">
             <a:extLst>
               <a:ext uri="{FF2B5EF4-FFF2-40B4-BE49-F238E27FC236}">
-                <a16:creationId xmlns:a16="http://schemas.microsoft.com/office/drawing/2014/main" id="{FE0F9148-4756-4E47-ABD4-175F21684029}"/>
+                <a16:creationId xmlns:a16="http://schemas.microsoft.com/office/drawing/2014/main" id="{3A6642C4-04C3-4A45-8DE4-9AAB847628C1}"/>
               </a:ext>
             </a:extLst>
           </p:cNvPr>
-          <p:cNvPicPr>
-            <a:picLocks noChangeAspect="1"/>
-          </p:cNvPicPr>
+          <p:cNvGrpSpPr/>
           <p:nvPr/>
-        </p:nvPicPr>
-        <p:blipFill>
-          <a:blip r:embed="rId3">
-            <a:extLst>
-              <a:ext uri="{28A0092B-C50C-407E-A947-70E740481C1C}">
-                <a14:useLocalDpi xmlns:a14="http://schemas.microsoft.com/office/drawing/2010/main" val="0"/>
-              </a:ext>
-            </a:extLst>
-          </a:blip>
-          <a:srcRect/>
-          <a:stretch/>
-        </p:blipFill>
-        <p:spPr>
+        </p:nvGrpSpPr>
+        <p:grpSpPr>
           <a:xfrm>
-            <a:off x="320472" y="0"/>
-            <a:ext cx="11551055" cy="6877572"/>
+            <a:off x="-71717" y="-1"/>
+            <a:ext cx="12353364" cy="6920753"/>
+            <a:chOff x="320472" y="0"/>
+            <a:chExt cx="11551055" cy="6877572"/>
           </a:xfrm>
-          <a:prstGeom prst="rect">
-            <a:avLst/>
-          </a:prstGeom>
-        </p:spPr>
-      </p:pic>
-      <p:sp>
-        <p:nvSpPr>
-          <p:cNvPr id="19" name="textbox_url">
-            <a:extLst>
-              <a:ext uri="{FF2B5EF4-FFF2-40B4-BE49-F238E27FC236}">
-                <a16:creationId xmlns:a16="http://schemas.microsoft.com/office/drawing/2014/main" id="{D57A06B9-E4F0-4B65-AE85-6C08F87C9544}"/>
-              </a:ext>
-            </a:extLst>
-          </p:cNvPr>
-          <p:cNvSpPr txBox="1"/>
-          <p:nvPr/>
-        </p:nvSpPr>
-        <p:spPr>
-          <a:xfrm>
-            <a:off x="3038475" y="333375"/>
-            <a:ext cx="6953250" cy="307777"/>
-          </a:xfrm>
-          <a:prstGeom prst="rect">
-            <a:avLst/>
-          </a:prstGeom>
-          <a:noFill/>
-        </p:spPr>
-        <p:txBody>
-          <a:bodyPr wrap="square" rtlCol="0">
-            <a:spAutoFit/>
-          </a:bodyPr>
-          <a:lstStyle/>
-          <a:p>
-            <a:r>
-              <a:rPr lang="en-GB" sz="1400" dirty="0">
-                <a:latin typeface="Microsoft Sans Serif" panose="020B0604020202020204" pitchFamily="34" charset="0"/>
+        </p:grpSpPr>
+        <p:pic>
+          <p:nvPicPr>
+            <p:cNvPr id="12" name="picture_tv">
+              <a:extLst>
+                <a:ext uri="{FF2B5EF4-FFF2-40B4-BE49-F238E27FC236}">
+                  <a16:creationId xmlns:a16="http://schemas.microsoft.com/office/drawing/2014/main" id="{FE0F9148-4756-4E47-ABD4-175F21684029}"/>
+                </a:ext>
+              </a:extLst>
+            </p:cNvPr>
+            <p:cNvPicPr>
+              <a:picLocks noChangeAspect="1"/>
+            </p:cNvPicPr>
+            <p:nvPr/>
+          </p:nvPicPr>
+          <p:blipFill>
+            <a:blip r:embed="rId3">
+              <a:extLst>
+                <a:ext uri="{28A0092B-C50C-407E-A947-70E740481C1C}">
+                  <a14:useLocalDpi xmlns:a14="http://schemas.microsoft.com/office/drawing/2010/main" val="0"/>
+                </a:ext>
+              </a:extLst>
+            </a:blip>
+            <a:srcRect/>
+            <a:stretch/>
+          </p:blipFill>
+          <p:spPr>
+            <a:xfrm>
+              <a:off x="320472" y="0"/>
+              <a:ext cx="11551055" cy="6877572"/>
+            </a:xfrm>
+            <a:prstGeom prst="rect">
+              <a:avLst/>
+            </a:prstGeom>
+          </p:spPr>
+        </p:pic>
+        <p:sp>
+          <p:nvSpPr>
+            <p:cNvPr id="19" name="textbox_url">
+              <a:extLst>
+                <a:ext uri="{FF2B5EF4-FFF2-40B4-BE49-F238E27FC236}">
+                  <a16:creationId xmlns:a16="http://schemas.microsoft.com/office/drawing/2014/main" id="{D57A06B9-E4F0-4B65-AE85-6C08F87C9544}"/>
+                </a:ext>
+              </a:extLst>
+            </p:cNvPr>
+            <p:cNvSpPr txBox="1"/>
+            <p:nvPr/>
+          </p:nvSpPr>
+          <p:spPr>
+            <a:xfrm>
+              <a:off x="3038475" y="333375"/>
+              <a:ext cx="6953250" cy="244685"/>
+            </a:xfrm>
+            <a:prstGeom prst="rect">
+              <a:avLst/>
+            </a:prstGeom>
+            <a:noFill/>
+          </p:spPr>
+          <p:txBody>
+            <a:bodyPr wrap="square" rtlCol="0">
+              <a:spAutoFit/>
+            </a:bodyPr>
+            <a:lstStyle/>
+            <a:p>
+              <a:r>
+                <a:rPr lang="en-GB" sz="1000">
+                  <a:latin typeface="Consolas" panose="020B0609020204030204" pitchFamily="49" charset="0"/>
+                  <a:ea typeface="Microsoft Sans Serif" panose="020B0604020202020204" pitchFamily="34" charset="0"/>
+                  <a:cs typeface="Microsoft Sans Serif" panose="020B0604020202020204" pitchFamily="34" charset="0"/>
+                </a:rPr>
+                <a:t>W</a:t>
+              </a:r>
+              <a:endParaRPr lang="en-GB" sz="1000" dirty="0">
+                <a:latin typeface="Consolas" panose="020B0609020204030204" pitchFamily="49" charset="0"/>
                 <a:ea typeface="Microsoft Sans Serif" panose="020B0604020202020204" pitchFamily="34" charset="0"/>
                 <a:cs typeface="Microsoft Sans Serif" panose="020B0604020202020204" pitchFamily="34" charset="0"/>
-              </a:rPr>
-              <a:t>http://www.in.grngr.grgrgrgrgrgrgrgrgrgrgrgrgrgrgrgrgrgrgrgrgrgrgrgrgr</a:t>
-            </a:r>
-          </a:p>
-        </p:txBody>
-      </p:sp>
-      <p:pic>
-        <p:nvPicPr>
-          <p:cNvPr id="21" name="picture_screenshot" descr="Graphical user interface, text, application&#10;&#10;Description automatically generated">
-            <a:extLst>
-              <a:ext uri="{FF2B5EF4-FFF2-40B4-BE49-F238E27FC236}">
-                <a16:creationId xmlns:a16="http://schemas.microsoft.com/office/drawing/2014/main" id="{91F4D2B1-45F4-4F9B-ACB6-DF4D6B89CF25}"/>
-              </a:ext>
-            </a:extLst>
-          </p:cNvPr>
-          <p:cNvPicPr>
-            <a:picLocks noChangeAspect="1"/>
-          </p:cNvPicPr>
-          <p:nvPr/>
-        </p:nvPicPr>
-        <p:blipFill>
-          <a:blip r:embed="rId4">
-            <a:extLst>
-              <a:ext uri="{28A0092B-C50C-407E-A947-70E740481C1C}">
-                <a14:useLocalDpi xmlns:a14="http://schemas.microsoft.com/office/drawing/2010/main" val="0"/>
-              </a:ext>
-            </a:extLst>
-          </a:blip>
-          <a:stretch>
-            <a:fillRect/>
-          </a:stretch>
-        </p:blipFill>
-        <p:spPr>
-          <a:xfrm>
-            <a:off x="720000" y="720000"/>
-            <a:ext cx="10800000" cy="5449200"/>
-          </a:xfrm>
-          <a:prstGeom prst="rect">
-            <a:avLst/>
-          </a:prstGeom>
-        </p:spPr>
-      </p:pic>
-      <p:pic>
-        <p:nvPicPr>
-          <p:cNvPr id="22" name="picture_screenshot">
-            <a:extLst>
-              <a:ext uri="{FF2B5EF4-FFF2-40B4-BE49-F238E27FC236}">
-                <a16:creationId xmlns:a16="http://schemas.microsoft.com/office/drawing/2014/main" id="{D1088852-A724-4B82-935B-9261F890475F}"/>
-              </a:ext>
-            </a:extLst>
-          </p:cNvPr>
-          <p:cNvPicPr>
-            <a:picLocks/>
-          </p:cNvPicPr>
-          <p:nvPr/>
-        </p:nvPicPr>
-        <p:blipFill>
-          <a:blip r:embed="rId5">
-            <a:extLst>
-              <a:ext uri="{28A0092B-C50C-407E-A947-70E740481C1C}">
-                <a14:useLocalDpi xmlns:a14="http://schemas.microsoft.com/office/drawing/2010/main" val="0"/>
-              </a:ext>
-            </a:extLst>
-          </a:blip>
-          <a:srcRect/>
-          <a:stretch/>
-        </p:blipFill>
-        <p:spPr>
-          <a:xfrm>
-            <a:off x="720000" y="720000"/>
-            <a:ext cx="10800000" cy="5400000"/>
-          </a:xfrm>
-          <a:prstGeom prst="rect">
-            <a:avLst/>
-          </a:prstGeom>
-        </p:spPr>
-      </p:pic>
+              </a:endParaRPr>
+            </a:p>
+          </p:txBody>
+        </p:sp>
+        <p:pic>
+          <p:nvPicPr>
+            <p:cNvPr id="22" name="picture_screenshot">
+              <a:extLst>
+                <a:ext uri="{FF2B5EF4-FFF2-40B4-BE49-F238E27FC236}">
+                  <a16:creationId xmlns:a16="http://schemas.microsoft.com/office/drawing/2014/main" id="{D1088852-A724-4B82-935B-9261F890475F}"/>
+                </a:ext>
+              </a:extLst>
+            </p:cNvPr>
+            <p:cNvPicPr>
+              <a:picLocks/>
+            </p:cNvPicPr>
+            <p:nvPr/>
+          </p:nvPicPr>
+          <p:blipFill>
+            <a:blip r:embed="rId4">
+              <a:extLst>
+                <a:ext uri="{28A0092B-C50C-407E-A947-70E740481C1C}">
+                  <a14:useLocalDpi xmlns:a14="http://schemas.microsoft.com/office/drawing/2010/main" val="0"/>
+                </a:ext>
+              </a:extLst>
+            </a:blip>
+            <a:srcRect/>
+            <a:stretch/>
+          </p:blipFill>
+          <p:spPr>
+            <a:xfrm>
+              <a:off x="720000" y="720000"/>
+              <a:ext cx="10800000" cy="5400000"/>
+            </a:xfrm>
+            <a:prstGeom prst="rect">
+              <a:avLst/>
+            </a:prstGeom>
+          </p:spPr>
+        </p:pic>
+      </p:grpSp>
     </p:spTree>
     <p:extLst>
       <p:ext uri="{BB962C8B-B14F-4D97-AF65-F5344CB8AC3E}">
@@ -4909,14 +4899,14 @@
   <p:clrMapOvr>
     <a:masterClrMapping/>
   </p:clrMapOvr>
-  <mc:AlternateContent xmlns:mc="http://schemas.openxmlformats.org/markup-compatibility/2006">
-    <mc:Choice xmlns:p14="http://schemas.microsoft.com/office/powerpoint/2010/main" Requires="p14">
-      <p:transition spd="slow" p14:dur="800" advClick="0" advTm="15000">
+  <mc:AlternateContent xmlns:mc="http://schemas.openxmlformats.org/markup-compatibility/2006" xmlns:p14="http://schemas.microsoft.com/office/powerpoint/2010/main">
+    <mc:Choice Requires="p14">
+      <p:transition spd="slow" p14:dur="800" advClick="0" advTm="10000">
         <p:circle/>
       </p:transition>
     </mc:Choice>
-    <mc:Fallback>
-      <p:transition spd="slow" advClick="0" advTm="15000">
+    <mc:Fallback xmlns="">
+      <p:transition spd="slow" advClick="0" advTm="10000">
         <p:circle/>
       </p:transition>
     </mc:Fallback>
@@ -4958,7 +4948,7 @@
                                           </p:stCondLst>
                                         </p:cTn>
                                         <p:tgtEl>
-                                          <p:spTgt spid="12"/>
+                                          <p:spTgt spid="5"/>
                                         </p:tgtEl>
                                         <p:attrNameLst>
                                           <p:attrName>style.visibility</p:attrName>
@@ -4972,7 +4962,7 @@
                                       <p:cBhvr>
                                         <p:cTn id="7" dur="500" fill="hold"/>
                                         <p:tgtEl>
-                                          <p:spTgt spid="12"/>
+                                          <p:spTgt spid="5"/>
                                         </p:tgtEl>
                                         <p:attrNameLst>
                                           <p:attrName>ppt_w</p:attrName>
@@ -4995,7 +4985,7 @@
                                       <p:cBhvr>
                                         <p:cTn id="8" dur="500" fill="hold"/>
                                         <p:tgtEl>
-                                          <p:spTgt spid="12"/>
+                                          <p:spTgt spid="5"/>
                                         </p:tgtEl>
                                         <p:attrNameLst>
                                           <p:attrName>ppt_h</p:attrName>
@@ -5018,95 +5008,7 @@
                                       <p:cBhvr>
                                         <p:cTn id="9" dur="500"/>
                                         <p:tgtEl>
-                                          <p:spTgt spid="12"/>
-                                        </p:tgtEl>
-                                      </p:cBhvr>
-                                    </p:animEffect>
-                                  </p:childTnLst>
-                                </p:cTn>
-                              </p:par>
-                            </p:childTnLst>
-                          </p:cTn>
-                        </p:par>
-                        <p:par>
-                          <p:cTn id="10" fill="hold">
-                            <p:stCondLst>
-                              <p:cond delay="500"/>
-                            </p:stCondLst>
-                            <p:childTnLst>
-                              <p:par>
-                                <p:cTn id="11" presetID="10" presetClass="entr" presetSubtype="0" fill="hold" nodeType="afterEffect">
-                                  <p:stCondLst>
-                                    <p:cond delay="0"/>
-                                  </p:stCondLst>
-                                  <p:childTnLst>
-                                    <p:set>
-                                      <p:cBhvr>
-                                        <p:cTn id="12" dur="1" fill="hold">
-                                          <p:stCondLst>
-                                            <p:cond delay="0"/>
-                                          </p:stCondLst>
-                                        </p:cTn>
-                                        <p:tgtEl>
-                                          <p:spTgt spid="21"/>
-                                        </p:tgtEl>
-                                        <p:attrNameLst>
-                                          <p:attrName>style.visibility</p:attrName>
-                                        </p:attrNameLst>
-                                      </p:cBhvr>
-                                      <p:to>
-                                        <p:strVal val="visible"/>
-                                      </p:to>
-                                    </p:set>
-                                    <p:animEffect transition="in" filter="fade">
-                                      <p:cBhvr>
-                                        <p:cTn id="13" dur="500"/>
-                                        <p:tgtEl>
-                                          <p:spTgt spid="21"/>
-                                        </p:tgtEl>
-                                      </p:cBhvr>
-                                    </p:animEffect>
-                                  </p:childTnLst>
-                                </p:cTn>
-                              </p:par>
-                            </p:childTnLst>
-                          </p:cTn>
-                        </p:par>
-                        <p:par>
-                          <p:cTn id="14" fill="hold">
-                            <p:stCondLst>
-                              <p:cond delay="1000"/>
-                            </p:stCondLst>
-                            <p:childTnLst>
-                              <p:par>
-                                <p:cTn id="15" presetID="10" presetClass="entr" presetSubtype="0" fill="hold" nodeType="afterEffect">
-                                  <p:stCondLst>
-                                    <p:cond delay="5000"/>
-                                  </p:stCondLst>
-                                  <p:childTnLst>
-                                    <p:set>
-                                      <p:cBhvr>
-                                        <p:cTn id="16" dur="1" fill="hold">
-                                          <p:stCondLst>
-                                            <p:cond delay="0"/>
-                                          </p:stCondLst>
-                                        </p:cTn>
-                                        <p:tgtEl>
-                                          <p:spTgt spid="22"/>
-                                        </p:tgtEl>
-                                        <p:attrNameLst>
-                                          <p:attrName>style.visibility</p:attrName>
-                                        </p:attrNameLst>
-                                      </p:cBhvr>
-                                      <p:to>
-                                        <p:strVal val="visible"/>
-                                      </p:to>
-                                    </p:set>
-                                    <p:animEffect transition="in" filter="fade">
-                                      <p:cBhvr>
-                                        <p:cTn id="17" dur="500"/>
-                                        <p:tgtEl>
-                                          <p:spTgt spid="22"/>
+                                          <p:spTgt spid="5"/>
                                         </p:tgtEl>
                                       </p:cBhvr>
                                     </p:animEffect>

</xml_diff>

<commit_message>
Renderer - fix transitions and animations
</commit_message>
<xml_diff>
--- a/Media/Render/template.pptx
+++ b/Media/Render/template.pptx
@@ -221,7 +221,7 @@
           <a:p>
             <a:fld id="{E0C7647B-9B1A-4DBD-BE63-06ADB54748A3}" type="datetimeFigureOut">
               <a:rPr lang="en-GB" dirty="0"/>
-              <a:t>14/12/2021</a:t>
+              <a:t>15/12/2021</a:t>
             </a:fld>
             <a:endParaRPr lang="en-GB" dirty="0"/>
           </a:p>
@@ -641,7 +641,7 @@
           <a:p>
             <a:fld id="{8C6EEDE2-052F-4B33-9288-FE1B3863A324}" type="datetimeFigureOut">
               <a:rPr lang="en-GB" dirty="0"/>
-              <a:t>14/12/2021</a:t>
+              <a:t>15/12/2021</a:t>
             </a:fld>
             <a:endParaRPr lang="en-GB" dirty="0"/>
           </a:p>
@@ -838,7 +838,7 @@
           <a:p>
             <a:fld id="{8C6EEDE2-052F-4B33-9288-FE1B3863A324}" type="datetimeFigureOut">
               <a:rPr lang="en-GB" dirty="0"/>
-              <a:t>14/12/2021</a:t>
+              <a:t>15/12/2021</a:t>
             </a:fld>
             <a:endParaRPr lang="en-GB" dirty="0"/>
           </a:p>
@@ -1101,7 +1101,7 @@
           <a:p>
             <a:fld id="{8C6EEDE2-052F-4B33-9288-FE1B3863A324}" type="datetimeFigureOut">
               <a:rPr lang="en-GB" dirty="0"/>
-              <a:t>14/12/2021</a:t>
+              <a:t>15/12/2021</a:t>
             </a:fld>
             <a:endParaRPr lang="en-GB" dirty="0"/>
           </a:p>
@@ -1354,7 +1354,7 @@
           <a:p>
             <a:fld id="{8C6EEDE2-052F-4B33-9288-FE1B3863A324}" type="datetimeFigureOut">
               <a:rPr lang="en-GB" dirty="0"/>
-              <a:t>14/12/2021</a:t>
+              <a:t>15/12/2021</a:t>
             </a:fld>
             <a:endParaRPr lang="en-GB" dirty="0"/>
           </a:p>
@@ -1747,7 +1747,7 @@
           <a:p>
             <a:fld id="{8C6EEDE2-052F-4B33-9288-FE1B3863A324}" type="datetimeFigureOut">
               <a:rPr lang="en-GB" dirty="0"/>
-              <a:t>14/12/2021</a:t>
+              <a:t>15/12/2021</a:t>
             </a:fld>
             <a:endParaRPr lang="en-GB" dirty="0"/>
           </a:p>
@@ -1880,7 +1880,7 @@
           <a:p>
             <a:fld id="{8C6EEDE2-052F-4B33-9288-FE1B3863A324}" type="datetimeFigureOut">
               <a:rPr lang="en-GB" dirty="0"/>
-              <a:t>14/12/2021</a:t>
+              <a:t>15/12/2021</a:t>
             </a:fld>
             <a:endParaRPr lang="en-GB" dirty="0"/>
           </a:p>
@@ -1985,7 +1985,7 @@
           <a:p>
             <a:fld id="{8C6EEDE2-052F-4B33-9288-FE1B3863A324}" type="datetimeFigureOut">
               <a:rPr lang="en-GB" dirty="0"/>
-              <a:t>14/12/2021</a:t>
+              <a:t>15/12/2021</a:t>
             </a:fld>
             <a:endParaRPr lang="en-GB" dirty="0"/>
           </a:p>
@@ -2282,7 +2282,7 @@
           <a:p>
             <a:fld id="{8C6EEDE2-052F-4B33-9288-FE1B3863A324}" type="datetimeFigureOut">
               <a:rPr lang="en-GB" dirty="0"/>
-              <a:t>14/12/2021</a:t>
+              <a:t>15/12/2021</a:t>
             </a:fld>
             <a:endParaRPr lang="en-GB" dirty="0"/>
           </a:p>
@@ -2556,7 +2556,7 @@
           <a:p>
             <a:fld id="{8C6EEDE2-052F-4B33-9288-FE1B3863A324}" type="datetimeFigureOut">
               <a:rPr lang="en-GB" dirty="0"/>
-              <a:t>14/12/2021</a:t>
+              <a:t>15/12/2021</a:t>
             </a:fld>
             <a:endParaRPr lang="en-GB" dirty="0"/>
           </a:p>
@@ -2745,7 +2745,7 @@
           <a:p>
             <a:fld id="{8C6EEDE2-052F-4B33-9288-FE1B3863A324}" type="datetimeFigureOut">
               <a:rPr lang="en-GB" dirty="0"/>
-              <a:t>14/12/2021</a:t>
+              <a:t>15/12/2021</a:t>
             </a:fld>
             <a:endParaRPr lang="en-GB" dirty="0"/>
           </a:p>
@@ -2981,7 +2981,7 @@
           <a:p>
             <a:fld id="{8C6EEDE2-052F-4B33-9288-FE1B3863A324}" type="datetimeFigureOut">
               <a:rPr lang="en-GB" dirty="0"/>
-              <a:t>14/12/2021</a:t>
+              <a:t>15/12/2021</a:t>
             </a:fld>
             <a:endParaRPr lang="en-GB" dirty="0"/>
           </a:p>
@@ -3715,12 +3715,12 @@
   </p:clrMapOvr>
   <mc:AlternateContent xmlns:mc="http://schemas.openxmlformats.org/markup-compatibility/2006" xmlns:p14="http://schemas.microsoft.com/office/powerpoint/2010/main">
     <mc:Choice Requires="p14">
-      <p:transition spd="med" p14:dur="700" advTm="6000">
+      <p:transition spd="med" p14:dur="700" advClick="0" advTm="10000">
         <p:fade/>
       </p:transition>
     </mc:Choice>
     <mc:Fallback xmlns="">
-      <p:transition spd="med" advTm="6000">
+      <p:transition spd="med" advClick="0" advTm="10000">
         <p:fade/>
       </p:transition>
     </mc:Fallback>
@@ -4023,8 +4023,8 @@
           </p:nvSpPr>
           <p:spPr bwMode="white">
             <a:xfrm>
-              <a:off x="147686" y="313039"/>
-              <a:ext cx="11909195" cy="769441"/>
+              <a:off x="147686" y="183596"/>
+              <a:ext cx="11909195" cy="1871898"/>
             </a:xfrm>
             <a:prstGeom prst="rect">
               <a:avLst/>
@@ -4036,8 +4036,8 @@
             </a:ln>
           </p:spPr>
           <p:txBody>
-            <a:bodyPr wrap="square">
-              <a:spAutoFit/>
+            <a:bodyPr wrap="square" anchor="t" anchorCtr="0">
+              <a:noAutofit/>
             </a:bodyPr>
             <a:lstStyle/>
             <a:p>
@@ -4067,8 +4067,8 @@
           </p:nvSpPr>
           <p:spPr bwMode="white">
             <a:xfrm>
-              <a:off x="1538765" y="1241133"/>
-              <a:ext cx="8858251" cy="3355086"/>
+              <a:off x="241504" y="2179852"/>
+              <a:ext cx="11721557" cy="2801088"/>
             </a:xfrm>
             <a:prstGeom prst="rect">
               <a:avLst/>
@@ -4080,8 +4080,8 @@
             </a:ln>
           </p:spPr>
           <p:txBody>
-            <a:bodyPr wrap="square">
-              <a:spAutoFit/>
+            <a:bodyPr wrap="square" anchor="ctr" anchorCtr="1">
+              <a:noAutofit/>
             </a:bodyPr>
             <a:lstStyle/>
             <a:p>
@@ -4269,12 +4269,12 @@
   </p:clrMapOvr>
   <mc:AlternateContent xmlns:mc="http://schemas.openxmlformats.org/markup-compatibility/2006" xmlns:p14="http://schemas.microsoft.com/office/powerpoint/2010/main">
     <mc:Choice Requires="p14">
-      <p:transition spd="med" p14:dur="700" advClick="0" advTm="15000">
+      <p:transition spd="med" p14:dur="700" advClick="0" advTm="10000">
         <p:fade/>
       </p:transition>
     </mc:Choice>
     <mc:Fallback xmlns="">
-      <p:transition spd="med" advClick="0" advTm="15000">
+      <p:transition spd="med" advClick="0" advTm="10000">
         <p:fade/>
       </p:transition>
     </mc:Fallback>
@@ -4511,7 +4511,7 @@
                               <p:par>
                                 <p:cTn id="19" presetID="2" presetClass="entr" presetSubtype="4" fill="hold" nodeType="afterEffect">
                                   <p:stCondLst>
-                                    <p:cond delay="2100"/>
+                                    <p:cond delay="1000"/>
                                   </p:stCondLst>
                                   <p:childTnLst>
                                     <p:set>
@@ -4578,88 +4578,6 @@
                                         </p:tav>
                                       </p:tavLst>
                                     </p:anim>
-                                  </p:childTnLst>
-                                </p:cTn>
-                              </p:par>
-                            </p:childTnLst>
-                          </p:cTn>
-                        </p:par>
-                        <p:par>
-                          <p:cTn id="23" fill="hold">
-                            <p:stCondLst>
-                              <p:cond delay="5600"/>
-                            </p:stCondLst>
-                            <p:childTnLst>
-                              <p:par>
-                                <p:cTn id="24" presetID="2" presetClass="exit" presetSubtype="4" fill="hold" nodeType="afterEffect">
-                                  <p:stCondLst>
-                                    <p:cond delay="8700"/>
-                                  </p:stCondLst>
-                                  <p:childTnLst>
-                                    <p:anim calcmode="lin" valueType="num">
-                                      <p:cBhvr additive="base">
-                                        <p:cTn id="25" dur="700"/>
-                                        <p:tgtEl>
-                                          <p:spTgt spid="12"/>
-                                        </p:tgtEl>
-                                        <p:attrNameLst>
-                                          <p:attrName>ppt_x</p:attrName>
-                                        </p:attrNameLst>
-                                      </p:cBhvr>
-                                      <p:tavLst>
-                                        <p:tav tm="0">
-                                          <p:val>
-                                            <p:strVal val="ppt_x"/>
-                                          </p:val>
-                                        </p:tav>
-                                        <p:tav tm="100000">
-                                          <p:val>
-                                            <p:strVal val="ppt_x"/>
-                                          </p:val>
-                                        </p:tav>
-                                      </p:tavLst>
-                                    </p:anim>
-                                    <p:anim calcmode="lin" valueType="num">
-                                      <p:cBhvr additive="base">
-                                        <p:cTn id="26" dur="700"/>
-                                        <p:tgtEl>
-                                          <p:spTgt spid="12"/>
-                                        </p:tgtEl>
-                                        <p:attrNameLst>
-                                          <p:attrName>ppt_y</p:attrName>
-                                        </p:attrNameLst>
-                                      </p:cBhvr>
-                                      <p:tavLst>
-                                        <p:tav tm="0">
-                                          <p:val>
-                                            <p:strVal val="ppt_y"/>
-                                          </p:val>
-                                        </p:tav>
-                                        <p:tav tm="100000">
-                                          <p:val>
-                                            <p:strVal val="1+ppt_h/2"/>
-                                          </p:val>
-                                        </p:tav>
-                                      </p:tavLst>
-                                    </p:anim>
-                                    <p:set>
-                                      <p:cBhvr>
-                                        <p:cTn id="27" dur="1" fill="hold">
-                                          <p:stCondLst>
-                                            <p:cond delay="699"/>
-                                          </p:stCondLst>
-                                        </p:cTn>
-                                        <p:tgtEl>
-                                          <p:spTgt spid="12"/>
-                                        </p:tgtEl>
-                                        <p:attrNameLst>
-                                          <p:attrName>style.visibility</p:attrName>
-                                        </p:attrNameLst>
-                                      </p:cBhvr>
-                                      <p:to>
-                                        <p:strVal val="hidden"/>
-                                      </p:to>
-                                    </p:set>
                                   </p:childTnLst>
                                 </p:cTn>
                               </p:par>
@@ -4867,7 +4785,7 @@
             </p:cNvPicPr>
             <p:nvPr/>
           </p:nvPicPr>
-          <p:blipFill>
+          <p:blipFill rotWithShape="1">
             <a:blip r:embed="rId4">
               <a:extLst>
                 <a:ext uri="{28A0092B-C50C-407E-A947-70E740481C1C}">
@@ -4875,13 +4793,13 @@
                 </a:ext>
               </a:extLst>
             </a:blip>
-            <a:srcRect/>
+            <a:srcRect l="-17388" r="-17388"/>
             <a:stretch/>
           </p:blipFill>
           <p:spPr>
             <a:xfrm>
-              <a:off x="720000" y="720000"/>
-              <a:ext cx="10800000" cy="5400000"/>
+              <a:off x="588290" y="721579"/>
+              <a:ext cx="10996271" cy="5434414"/>
             </a:xfrm>
             <a:prstGeom prst="rect">
               <a:avLst/>
@@ -4899,14 +4817,14 @@
   <p:clrMapOvr>
     <a:masterClrMapping/>
   </p:clrMapOvr>
-  <mc:AlternateContent xmlns:mc="http://schemas.openxmlformats.org/markup-compatibility/2006" xmlns:p14="http://schemas.microsoft.com/office/powerpoint/2010/main">
-    <mc:Choice Requires="p14">
-      <p:transition spd="slow" p14:dur="800" advClick="0" advTm="10000">
+  <mc:AlternateContent xmlns:mc="http://schemas.openxmlformats.org/markup-compatibility/2006">
+    <mc:Choice xmlns:p14="http://schemas.microsoft.com/office/powerpoint/2010/main" Requires="p14">
+      <p:transition spd="med" p14:dur="600" advClick="0" advTm="10000">
         <p:circle/>
       </p:transition>
     </mc:Choice>
-    <mc:Fallback xmlns="">
-      <p:transition spd="slow" advClick="0" advTm="10000">
+    <mc:Fallback>
+      <p:transition spd="med" advClick="0" advTm="10000">
         <p:circle/>
       </p:transition>
     </mc:Fallback>

</xml_diff>

<commit_message>
Fixed puzzle and keyword render imperfections
</commit_message>
<xml_diff>
--- a/Media/Render/template.pptx
+++ b/Media/Render/template.pptx
@@ -5,12 +5,13 @@
     <p:sldMasterId id="2147483648" r:id="rId1"/>
   </p:sldMasterIdLst>
   <p:notesMasterIdLst>
-    <p:notesMasterId r:id="rId5"/>
+    <p:notesMasterId r:id="rId6"/>
   </p:notesMasterIdLst>
   <p:sldIdLst>
     <p:sldId id="256" r:id="rId2"/>
     <p:sldId id="258" r:id="rId3"/>
     <p:sldId id="259" r:id="rId4"/>
+    <p:sldId id="260" r:id="rId5"/>
   </p:sldIdLst>
   <p:sldSz cx="12192000" cy="6858000"/>
   <p:notesSz cx="6858000" cy="9144000"/>
@@ -117,6 +118,7 @@
             <p14:sldId id="256"/>
             <p14:sldId id="258"/>
             <p14:sldId id="259"/>
+            <p14:sldId id="260"/>
           </p14:sldIdLst>
         </p14:section>
       </p14:sectionLst>
@@ -3427,47 +3429,6 @@
           </a:ln>
         </p:spPr>
       </p:pic>
-      <p:sp>
-        <p:nvSpPr>
-          <p:cNvPr id="15" name="SyncfusionLicense"/>
-          <p:cNvSpPr txBox="1">
-            <a:spLocks noChangeArrowheads="1"/>
-          </p:cNvSpPr>
-          <p:nvPr/>
-        </p:nvSpPr>
-        <p:spPr bwMode="white">
-          <a:xfrm>
-            <a:off x="3365500" y="6096000"/>
-            <a:ext cx="5461000" cy="381000"/>
-          </a:xfrm>
-          <a:prstGeom prst="rect">
-            <a:avLst/>
-          </a:prstGeom>
-          <a:ln>
-            <a:headEnd type="none"/>
-            <a:tailEnd type="none"/>
-          </a:ln>
-        </p:spPr>
-        <p:txBody>
-          <a:bodyPr wrap="square" anchor="ctr">
-            <a:spAutoFit/>
-          </a:bodyPr>
-          <a:lstStyle/>
-          <a:p>
-            <a:pPr algn="ctr" defTabSz="914400">
-              <a:defRPr sz="1400" dirty="0"/>
-            </a:pPr>
-            <a:r>
-              <a:rPr dirty="0">
-                <a:solidFill>
-                  <a:srgbClr val="000000"/>
-                </a:solidFill>
-              </a:rPr>
-              <a:t>Created with a trial version of Syncfusion Essential Presentation</a:t>
-            </a:r>
-          </a:p>
-        </p:txBody>
-      </p:sp>
       <p:grpSp>
         <p:nvGrpSpPr>
           <p:cNvPr id="6" name="puzzle_metadata"/>
@@ -3626,88 +3587,6 @@
           </p:txBody>
         </p:sp>
       </p:grpSp>
-      <p:sp>
-        <p:nvSpPr>
-          <p:cNvPr id="16" name="SyncfusionLicense"/>
-          <p:cNvSpPr txBox="1">
-            <a:spLocks noChangeArrowheads="1"/>
-          </p:cNvSpPr>
-          <p:nvPr/>
-        </p:nvSpPr>
-        <p:spPr bwMode="white">
-          <a:xfrm>
-            <a:off x="3365500" y="6096000"/>
-            <a:ext cx="5461000" cy="381000"/>
-          </a:xfrm>
-          <a:prstGeom prst="rect">
-            <a:avLst/>
-          </a:prstGeom>
-          <a:ln>
-            <a:headEnd type="none"/>
-            <a:tailEnd type="none"/>
-          </a:ln>
-        </p:spPr>
-        <p:txBody>
-          <a:bodyPr wrap="square" anchor="ctr">
-            <a:spAutoFit/>
-          </a:bodyPr>
-          <a:lstStyle/>
-          <a:p>
-            <a:pPr algn="ctr" defTabSz="914400">
-              <a:defRPr sz="1400" dirty="0"/>
-            </a:pPr>
-            <a:r>
-              <a:rPr dirty="0">
-                <a:solidFill>
-                  <a:srgbClr val="000000"/>
-                </a:solidFill>
-              </a:rPr>
-              <a:t>Created with a trial version of Syncfusion Essential Presentation</a:t>
-            </a:r>
-          </a:p>
-        </p:txBody>
-      </p:sp>
-      <p:sp>
-        <p:nvSpPr>
-          <p:cNvPr id="17" name="SyncfusionLicense"/>
-          <p:cNvSpPr txBox="1">
-            <a:spLocks noChangeArrowheads="1"/>
-          </p:cNvSpPr>
-          <p:nvPr/>
-        </p:nvSpPr>
-        <p:spPr bwMode="white">
-          <a:xfrm>
-            <a:off x="3365500" y="6096000"/>
-            <a:ext cx="5461000" cy="381000"/>
-          </a:xfrm>
-          <a:prstGeom prst="rect">
-            <a:avLst/>
-          </a:prstGeom>
-          <a:ln>
-            <a:headEnd type="none"/>
-            <a:tailEnd type="none"/>
-          </a:ln>
-        </p:spPr>
-        <p:txBody>
-          <a:bodyPr wrap="square" anchor="ctr">
-            <a:spAutoFit/>
-          </a:bodyPr>
-          <a:lstStyle/>
-          <a:p>
-            <a:pPr algn="ctr" defTabSz="914400">
-              <a:defRPr sz="1400" dirty="0"/>
-            </a:pPr>
-            <a:r>
-              <a:rPr dirty="0">
-                <a:solidFill>
-                  <a:srgbClr val="000000"/>
-                </a:solidFill>
-              </a:rPr>
-              <a:t>Created with a trial version of Syncfusion Essential Presentation</a:t>
-            </a:r>
-          </a:p>
-        </p:txBody>
-      </p:sp>
     </p:spTree>
   </p:cSld>
   <p:clrMapOvr>
@@ -4180,88 +4059,6 @@
           </p:txBody>
         </p:sp>
       </p:grpSp>
-      <p:sp>
-        <p:nvSpPr>
-          <p:cNvPr id="18" name="SyncfusionLicense"/>
-          <p:cNvSpPr txBox="1">
-            <a:spLocks noChangeArrowheads="1"/>
-          </p:cNvSpPr>
-          <p:nvPr/>
-        </p:nvSpPr>
-        <p:spPr bwMode="white">
-          <a:xfrm>
-            <a:off x="3365500" y="6096000"/>
-            <a:ext cx="5461000" cy="381000"/>
-          </a:xfrm>
-          <a:prstGeom prst="rect">
-            <a:avLst/>
-          </a:prstGeom>
-          <a:ln>
-            <a:headEnd type="none"/>
-            <a:tailEnd type="none"/>
-          </a:ln>
-        </p:spPr>
-        <p:txBody>
-          <a:bodyPr wrap="square" anchor="ctr">
-            <a:spAutoFit/>
-          </a:bodyPr>
-          <a:lstStyle/>
-          <a:p>
-            <a:pPr algn="ctr" defTabSz="914400">
-              <a:defRPr sz="1400" dirty="0"/>
-            </a:pPr>
-            <a:r>
-              <a:rPr dirty="0">
-                <a:solidFill>
-                  <a:srgbClr val="000000"/>
-                </a:solidFill>
-              </a:rPr>
-              <a:t>Created with a trial version of Syncfusion Essential Presentation</a:t>
-            </a:r>
-          </a:p>
-        </p:txBody>
-      </p:sp>
-      <p:sp>
-        <p:nvSpPr>
-          <p:cNvPr id="19" name="SyncfusionLicense"/>
-          <p:cNvSpPr txBox="1">
-            <a:spLocks noChangeArrowheads="1"/>
-          </p:cNvSpPr>
-          <p:nvPr/>
-        </p:nvSpPr>
-        <p:spPr bwMode="white">
-          <a:xfrm>
-            <a:off x="3365500" y="6096000"/>
-            <a:ext cx="5461000" cy="381000"/>
-          </a:xfrm>
-          <a:prstGeom prst="rect">
-            <a:avLst/>
-          </a:prstGeom>
-          <a:ln>
-            <a:headEnd type="none"/>
-            <a:tailEnd type="none"/>
-          </a:ln>
-        </p:spPr>
-        <p:txBody>
-          <a:bodyPr wrap="square" anchor="ctr">
-            <a:spAutoFit/>
-          </a:bodyPr>
-          <a:lstStyle/>
-          <a:p>
-            <a:pPr algn="ctr" defTabSz="914400">
-              <a:defRPr sz="1400" dirty="0"/>
-            </a:pPr>
-            <a:r>
-              <a:rPr dirty="0">
-                <a:solidFill>
-                  <a:srgbClr val="000000"/>
-                </a:solidFill>
-              </a:rPr>
-              <a:t>Created with a trial version of Syncfusion Essential Presentation</a:t>
-            </a:r>
-          </a:p>
-        </p:txBody>
-      </p:sp>
     </p:spTree>
   </p:cSld>
   <p:clrMapOvr>
@@ -4581,6 +4378,32 @@
                                   </p:childTnLst>
                                 </p:cTn>
                               </p:par>
+                              <p:par>
+                                <p:cTn id="23" presetID="26" presetClass="emph" presetSubtype="0" fill="hold" nodeType="withEffect">
+                                  <p:stCondLst>
+                                    <p:cond delay="0"/>
+                                  </p:stCondLst>
+                                  <p:childTnLst>
+                                    <p:animEffect transition="out" filter="fade">
+                                      <p:cBhvr>
+                                        <p:cTn id="24" dur="600" tmFilter="0, 0; .2, .5; .8, .5; 1, 0"/>
+                                        <p:tgtEl>
+                                          <p:spTgt spid="14"/>
+                                        </p:tgtEl>
+                                      </p:cBhvr>
+                                    </p:animEffect>
+                                    <p:animScale>
+                                      <p:cBhvr>
+                                        <p:cTn id="25" dur="300" autoRev="1" fill="hold"/>
+                                        <p:tgtEl>
+                                          <p:spTgt spid="14"/>
+                                        </p:tgtEl>
+                                      </p:cBhvr>
+                                      <p:by x="105000" y="105000"/>
+                                    </p:animScale>
+                                  </p:childTnLst>
+                                </p:cTn>
+                              </p:par>
                             </p:childTnLst>
                           </p:cTn>
                         </p:par>
@@ -4686,10 +4509,10 @@
         </p:nvGrpSpPr>
         <p:grpSpPr>
           <a:xfrm>
-            <a:off x="-71717" y="-1"/>
-            <a:ext cx="12353364" cy="6920753"/>
+            <a:off x="-80682" y="0"/>
+            <a:ext cx="12353364" cy="6928759"/>
             <a:chOff x="320472" y="0"/>
-            <a:chExt cx="11551055" cy="6877572"/>
+            <a:chExt cx="11551055" cy="6885526"/>
           </a:xfrm>
         </p:grpSpPr>
         <p:pic>
@@ -4806,6 +4629,85 @@
             </a:prstGeom>
           </p:spPr>
         </p:pic>
+        <p:sp>
+          <p:nvSpPr>
+            <p:cNvPr id="26" name="textbox_source">
+              <a:extLst>
+                <a:ext uri="{FF2B5EF4-FFF2-40B4-BE49-F238E27FC236}">
+                  <a16:creationId xmlns:a16="http://schemas.microsoft.com/office/drawing/2014/main" id="{BED03901-0322-47CB-95AA-73932BC3713E}"/>
+                </a:ext>
+              </a:extLst>
+            </p:cNvPr>
+            <p:cNvSpPr txBox="1"/>
+            <p:nvPr/>
+          </p:nvSpPr>
+          <p:spPr>
+            <a:xfrm>
+              <a:off x="395914" y="6518498"/>
+              <a:ext cx="4781093" cy="367028"/>
+            </a:xfrm>
+            <a:prstGeom prst="rect">
+              <a:avLst/>
+            </a:prstGeom>
+            <a:noFill/>
+          </p:spPr>
+          <p:txBody>
+            <a:bodyPr wrap="square" rtlCol="0">
+              <a:spAutoFit/>
+            </a:bodyPr>
+            <a:lstStyle/>
+            <a:p>
+              <a:r>
+                <a:rPr lang="en-GB" dirty="0">
+                  <a:latin typeface="Lucida Sans" panose="020B0602030504020204" pitchFamily="34" charset="0"/>
+                  <a:ea typeface="Microsoft Sans Serif" panose="020B0604020202020204" pitchFamily="34" charset="0"/>
+                  <a:cs typeface="Microsoft Sans Serif" panose="020B0604020202020204" pitchFamily="34" charset="0"/>
+                </a:rPr>
+                <a:t>Source: FORBES</a:t>
+              </a:r>
+            </a:p>
+          </p:txBody>
+        </p:sp>
+        <p:sp>
+          <p:nvSpPr>
+            <p:cNvPr id="28" name="textbox_date">
+              <a:extLst>
+                <a:ext uri="{FF2B5EF4-FFF2-40B4-BE49-F238E27FC236}">
+                  <a16:creationId xmlns:a16="http://schemas.microsoft.com/office/drawing/2014/main" id="{D8BB7785-88A9-4222-A746-3C5B3CEACC7E}"/>
+                </a:ext>
+              </a:extLst>
+            </p:cNvPr>
+            <p:cNvSpPr txBox="1"/>
+            <p:nvPr/>
+          </p:nvSpPr>
+          <p:spPr>
+            <a:xfrm>
+              <a:off x="6908164" y="6518498"/>
+              <a:ext cx="4781093" cy="367028"/>
+            </a:xfrm>
+            <a:prstGeom prst="rect">
+              <a:avLst/>
+            </a:prstGeom>
+            <a:noFill/>
+          </p:spPr>
+          <p:txBody>
+            <a:bodyPr wrap="square" rtlCol="0">
+              <a:spAutoFit/>
+            </a:bodyPr>
+            <a:lstStyle/>
+            <a:p>
+              <a:pPr algn="r"/>
+              <a:r>
+                <a:rPr lang="en-GB" dirty="0">
+                  <a:latin typeface="Lucida Sans" panose="020B0602030504020204" pitchFamily="34" charset="0"/>
+                  <a:ea typeface="Microsoft Sans Serif" panose="020B0604020202020204" pitchFamily="34" charset="0"/>
+                  <a:cs typeface="Microsoft Sans Serif" panose="020B0604020202020204" pitchFamily="34" charset="0"/>
+                </a:rPr>
+                <a:t>Date Published: 24/10/1929</a:t>
+              </a:r>
+            </a:p>
+          </p:txBody>
+        </p:sp>
       </p:grpSp>
     </p:spTree>
     <p:extLst>
@@ -4817,13 +4719,13 @@
   <p:clrMapOvr>
     <a:masterClrMapping/>
   </p:clrMapOvr>
-  <mc:AlternateContent xmlns:mc="http://schemas.openxmlformats.org/markup-compatibility/2006">
-    <mc:Choice xmlns:p14="http://schemas.microsoft.com/office/powerpoint/2010/main" Requires="p14">
+  <mc:AlternateContent xmlns:mc="http://schemas.openxmlformats.org/markup-compatibility/2006" xmlns:p14="http://schemas.microsoft.com/office/powerpoint/2010/main">
+    <mc:Choice Requires="p14">
       <p:transition spd="med" p14:dur="600" advClick="0" advTm="10000">
         <p:circle/>
       </p:transition>
     </mc:Choice>
-    <mc:Fallback>
+    <mc:Fallback xmlns="">
       <p:transition spd="med" advClick="0" advTm="10000">
         <p:circle/>
       </p:transition>
@@ -4930,6 +4832,804 @@
                                         </p:tgtEl>
                                       </p:cBhvr>
                                     </p:animEffect>
+                                  </p:childTnLst>
+                                </p:cTn>
+                              </p:par>
+                            </p:childTnLst>
+                          </p:cTn>
+                        </p:par>
+                      </p:childTnLst>
+                    </p:cTn>
+                  </p:par>
+                </p:childTnLst>
+              </p:cTn>
+              <p:prevCondLst>
+                <p:cond evt="onPrev" delay="0">
+                  <p:tgtEl>
+                    <p:sldTgt/>
+                  </p:tgtEl>
+                </p:cond>
+              </p:prevCondLst>
+              <p:nextCondLst>
+                <p:cond evt="onNext" delay="0">
+                  <p:tgtEl>
+                    <p:sldTgt/>
+                  </p:tgtEl>
+                </p:cond>
+              </p:nextCondLst>
+            </p:seq>
+          </p:childTnLst>
+        </p:cTn>
+      </p:par>
+    </p:tnLst>
+  </p:timing>
+</p:sld>
+</file>
+
+<file path=ppt/slides/slide4.xml><?xml version="1.0" encoding="utf-8"?>
+<p:sld xmlns:a="http://schemas.openxmlformats.org/drawingml/2006/main" xmlns:r="http://schemas.openxmlformats.org/officeDocument/2006/relationships" xmlns:p="http://schemas.openxmlformats.org/presentationml/2006/main">
+  <p:cSld>
+    <p:bg>
+      <p:bgPr>
+        <a:blipFill dpi="0" rotWithShape="1">
+          <a:blip r:embed="rId2">
+            <a:lum/>
+          </a:blip>
+          <a:srcRect/>
+          <a:stretch>
+            <a:fillRect/>
+          </a:stretch>
+        </a:blipFill>
+        <a:effectLst/>
+      </p:bgPr>
+    </p:bg>
+    <p:spTree>
+      <p:nvGrpSpPr>
+        <p:cNvPr id="1" name=""/>
+        <p:cNvGrpSpPr/>
+        <p:nvPr/>
+      </p:nvGrpSpPr>
+      <p:grpSpPr>
+        <a:xfrm>
+          <a:off x="0" y="0"/>
+          <a:ext cx="0" cy="0"/>
+          <a:chOff x="0" y="0"/>
+          <a:chExt cx="0" cy="0"/>
+        </a:xfrm>
+      </p:grpSpPr>
+      <p:pic>
+        <p:nvPicPr>
+          <p:cNvPr id="5" name="Picture 4" descr="A person with a stethoscope around her neck&#10;&#10;Description automatically generated with low confidence">
+            <a:extLst>
+              <a:ext uri="{FF2B5EF4-FFF2-40B4-BE49-F238E27FC236}">
+                <a16:creationId xmlns:a16="http://schemas.microsoft.com/office/drawing/2014/main" id="{5F4798DB-AAD1-459B-8541-AF707EAD250C}"/>
+              </a:ext>
+            </a:extLst>
+          </p:cNvPr>
+          <p:cNvPicPr>
+            <a:picLocks noChangeAspect="1"/>
+          </p:cNvPicPr>
+          <p:nvPr/>
+        </p:nvPicPr>
+        <p:blipFill>
+          <a:blip r:embed="rId3">
+            <a:extLst>
+              <a:ext uri="{28A0092B-C50C-407E-A947-70E740481C1C}">
+                <a14:useLocalDpi xmlns:a14="http://schemas.microsoft.com/office/drawing/2010/main" val="0"/>
+              </a:ext>
+            </a:extLst>
+          </a:blip>
+          <a:stretch>
+            <a:fillRect/>
+          </a:stretch>
+        </p:blipFill>
+        <p:spPr>
+          <a:xfrm>
+            <a:off x="0" y="0"/>
+            <a:ext cx="12192000" cy="6858000"/>
+          </a:xfrm>
+          <a:prstGeom prst="rect">
+            <a:avLst/>
+          </a:prstGeom>
+        </p:spPr>
+      </p:pic>
+      <p:pic>
+        <p:nvPicPr>
+          <p:cNvPr id="14" name="Picture 13">
+            <a:extLst>
+              <a:ext uri="{FF2B5EF4-FFF2-40B4-BE49-F238E27FC236}">
+                <a16:creationId xmlns:a16="http://schemas.microsoft.com/office/drawing/2014/main" id="{7FDF0FC7-68D5-40C7-A6B4-B9F44315305A}"/>
+              </a:ext>
+            </a:extLst>
+          </p:cNvPr>
+          <p:cNvPicPr>
+            <a:picLocks noChangeAspect="1"/>
+          </p:cNvPicPr>
+          <p:nvPr/>
+        </p:nvPicPr>
+        <p:blipFill>
+          <a:blip r:embed="rId4">
+            <a:extLst>
+              <a:ext uri="{28A0092B-C50C-407E-A947-70E740481C1C}">
+                <a14:useLocalDpi xmlns:a14="http://schemas.microsoft.com/office/drawing/2010/main" val="0"/>
+              </a:ext>
+            </a:extLst>
+          </a:blip>
+          <a:srcRect/>
+          <a:stretch/>
+        </p:blipFill>
+        <p:spPr>
+          <a:xfrm>
+            <a:off x="0" y="0"/>
+            <a:ext cx="12192000" cy="6848966"/>
+          </a:xfrm>
+          <a:prstGeom prst="rect">
+            <a:avLst/>
+          </a:prstGeom>
+        </p:spPr>
+      </p:pic>
+      <p:pic>
+        <p:nvPicPr>
+          <p:cNvPr id="18" name="Picture 17">
+            <a:extLst>
+              <a:ext uri="{FF2B5EF4-FFF2-40B4-BE49-F238E27FC236}">
+                <a16:creationId xmlns:a16="http://schemas.microsoft.com/office/drawing/2014/main" id="{47E26648-AA80-48CD-8AC3-D4DF23BAE1DD}"/>
+              </a:ext>
+            </a:extLst>
+          </p:cNvPr>
+          <p:cNvPicPr>
+            <a:picLocks noChangeAspect="1"/>
+          </p:cNvPicPr>
+          <p:nvPr/>
+        </p:nvPicPr>
+        <p:blipFill>
+          <a:blip r:embed="rId5">
+            <a:extLst>
+              <a:ext uri="{28A0092B-C50C-407E-A947-70E740481C1C}">
+                <a14:useLocalDpi xmlns:a14="http://schemas.microsoft.com/office/drawing/2010/main" val="0"/>
+              </a:ext>
+            </a:extLst>
+          </a:blip>
+          <a:srcRect/>
+          <a:stretch/>
+        </p:blipFill>
+        <p:spPr>
+          <a:xfrm>
+            <a:off x="0" y="-9034"/>
+            <a:ext cx="12192000" cy="6848966"/>
+          </a:xfrm>
+          <a:prstGeom prst="rect">
+            <a:avLst/>
+          </a:prstGeom>
+        </p:spPr>
+      </p:pic>
+      <p:pic>
+        <p:nvPicPr>
+          <p:cNvPr id="19" name="Picture 18">
+            <a:extLst>
+              <a:ext uri="{FF2B5EF4-FFF2-40B4-BE49-F238E27FC236}">
+                <a16:creationId xmlns:a16="http://schemas.microsoft.com/office/drawing/2014/main" id="{252D9ECA-0080-474F-84FA-FDA4755AAF28}"/>
+              </a:ext>
+            </a:extLst>
+          </p:cNvPr>
+          <p:cNvPicPr>
+            <a:picLocks noChangeAspect="1"/>
+          </p:cNvPicPr>
+          <p:nvPr/>
+        </p:nvPicPr>
+        <p:blipFill>
+          <a:blip r:embed="rId6">
+            <a:extLst>
+              <a:ext uri="{28A0092B-C50C-407E-A947-70E740481C1C}">
+                <a14:useLocalDpi xmlns:a14="http://schemas.microsoft.com/office/drawing/2010/main" val="0"/>
+              </a:ext>
+            </a:extLst>
+          </a:blip>
+          <a:srcRect/>
+          <a:stretch/>
+        </p:blipFill>
+        <p:spPr>
+          <a:xfrm>
+            <a:off x="0" y="-18068"/>
+            <a:ext cx="12192000" cy="6848966"/>
+          </a:xfrm>
+          <a:prstGeom prst="rect">
+            <a:avLst/>
+          </a:prstGeom>
+        </p:spPr>
+      </p:pic>
+      <p:grpSp>
+        <p:nvGrpSpPr>
+          <p:cNvPr id="20" name="puzzle_conclusion">
+            <a:extLst>
+              <a:ext uri="{FF2B5EF4-FFF2-40B4-BE49-F238E27FC236}">
+                <a16:creationId xmlns:a16="http://schemas.microsoft.com/office/drawing/2014/main" id="{ADF02B5E-3DA0-4B9C-960F-8AC7CC212AC9}"/>
+              </a:ext>
+            </a:extLst>
+          </p:cNvPr>
+          <p:cNvGrpSpPr>
+            <a:grpSpLocks/>
+          </p:cNvGrpSpPr>
+          <p:nvPr/>
+        </p:nvGrpSpPr>
+        <p:grpSpPr bwMode="white">
+          <a:xfrm>
+            <a:off x="153971" y="158496"/>
+            <a:ext cx="11896626" cy="6559296"/>
+            <a:chOff x="160256" y="154386"/>
+            <a:chExt cx="11896626" cy="4855764"/>
+          </a:xfrm>
+        </p:grpSpPr>
+        <p:sp>
+          <p:nvSpPr>
+            <p:cNvPr id="21" name="conclusion_shape">
+              <a:extLst>
+                <a:ext uri="{FF2B5EF4-FFF2-40B4-BE49-F238E27FC236}">
+                  <a16:creationId xmlns:a16="http://schemas.microsoft.com/office/drawing/2014/main" id="{08AD4BF3-9927-48BC-AB62-E9DAC494F081}"/>
+                </a:ext>
+              </a:extLst>
+            </p:cNvPr>
+            <p:cNvSpPr>
+              <a:spLocks/>
+            </p:cNvSpPr>
+            <p:nvPr/>
+          </p:nvSpPr>
+          <p:spPr bwMode="white">
+            <a:xfrm>
+              <a:off x="160256" y="154386"/>
+              <a:ext cx="11896626" cy="4855764"/>
+            </a:xfrm>
+            <a:prstGeom prst="roundRect">
+              <a:avLst/>
+            </a:prstGeom>
+            <a:solidFill>
+              <a:schemeClr val="bg1"/>
+            </a:solidFill>
+            <a:ln>
+              <a:headEnd type="none"/>
+              <a:tailEnd type="none"/>
+            </a:ln>
+            <a:effectLst/>
+          </p:spPr>
+          <p:style>
+            <a:lnRef idx="2">
+              <a:schemeClr val="accent1">
+                <a:shade val="50000"/>
+              </a:schemeClr>
+            </a:lnRef>
+            <a:fillRef idx="1">
+              <a:schemeClr val="accent1"/>
+            </a:fillRef>
+            <a:effectRef idx="0">
+              <a:schemeClr val="accent1"/>
+            </a:effectRef>
+            <a:fontRef idx="minor">
+              <a:schemeClr val="lt1"/>
+            </a:fontRef>
+          </p:style>
+          <p:txBody>
+            <a:bodyPr wrap="square" anchor="ctr"/>
+            <a:lstStyle/>
+            <a:p>
+              <a:pPr algn="ctr" defTabSz="914400"/>
+              <a:endParaRPr lang="en-GB" dirty="0"/>
+            </a:p>
+          </p:txBody>
+        </p:sp>
+        <p:sp>
+          <p:nvSpPr>
+            <p:cNvPr id="23" name="conclusion_text">
+              <a:extLst>
+                <a:ext uri="{FF2B5EF4-FFF2-40B4-BE49-F238E27FC236}">
+                  <a16:creationId xmlns:a16="http://schemas.microsoft.com/office/drawing/2014/main" id="{0E8AB154-C795-442F-A66F-86DEB3BF898F}"/>
+                </a:ext>
+              </a:extLst>
+            </p:cNvPr>
+            <p:cNvSpPr txBox="1">
+              <a:spLocks noChangeArrowheads="1"/>
+            </p:cNvSpPr>
+            <p:nvPr/>
+          </p:nvSpPr>
+          <p:spPr bwMode="white">
+            <a:xfrm>
+              <a:off x="241504" y="154386"/>
+              <a:ext cx="11721557" cy="4826554"/>
+            </a:xfrm>
+            <a:prstGeom prst="rect">
+              <a:avLst/>
+            </a:prstGeom>
+            <a:noFill/>
+            <a:ln>
+              <a:headEnd type="none"/>
+              <a:tailEnd type="none"/>
+            </a:ln>
+          </p:spPr>
+          <p:txBody>
+            <a:bodyPr wrap="square" anchor="ctr" anchorCtr="1">
+              <a:noAutofit/>
+            </a:bodyPr>
+            <a:lstStyle/>
+            <a:p>
+              <a:pPr marL="342900" indent="-342900" algn="ctr" defTabSz="914400">
+                <a:lnSpc>
+                  <a:spcPct val="150000"/>
+                </a:lnSpc>
+                <a:buFontTx/>
+                <a:buChar char="-"/>
+              </a:pPr>
+              <a:r>
+                <a:rPr lang="en-GB" sz="2400" dirty="0">
+                  <a:solidFill>
+                    <a:schemeClr val="accent1">
+                      <a:lumMod val="50000"/>
+                    </a:schemeClr>
+                  </a:solidFill>
+                  <a:latin typeface="Comic Sans MS"/>
+                </a:rPr>
+                <a:t>Covid "vaccines" are actually gene therapy.</a:t>
+              </a:r>
+            </a:p>
+            <a:p>
+              <a:pPr algn="ctr" defTabSz="914400">
+                <a:lnSpc>
+                  <a:spcPct val="150000"/>
+                </a:lnSpc>
+              </a:pPr>
+              <a:endParaRPr lang="en-GB" sz="2400" dirty="0">
+                <a:solidFill>
+                  <a:schemeClr val="accent1">
+                    <a:lumMod val="50000"/>
+                  </a:schemeClr>
+                </a:solidFill>
+                <a:latin typeface="Comic Sans MS"/>
+              </a:endParaRPr>
+            </a:p>
+            <a:p>
+              <a:pPr marL="342900" indent="-342900" algn="ctr" defTabSz="914400">
+                <a:lnSpc>
+                  <a:spcPct val="150000"/>
+                </a:lnSpc>
+                <a:buFontTx/>
+                <a:buChar char="-"/>
+              </a:pPr>
+              <a:r>
+                <a:rPr lang="en-GB" sz="2400" dirty="0">
+                  <a:solidFill>
+                    <a:schemeClr val="accent1">
+                      <a:lumMod val="50000"/>
+                    </a:schemeClr>
+                  </a:solidFill>
+                  <a:latin typeface="Comic Sans MS"/>
+                </a:rPr>
+                <a:t>Covid "vaccines" use the same technology as GM foods. Begs the question, are vaccine takers Genetically Modified Organisms?</a:t>
+              </a:r>
+            </a:p>
+            <a:p>
+              <a:pPr marL="342900" indent="-342900" algn="ctr" defTabSz="914400">
+                <a:lnSpc>
+                  <a:spcPct val="150000"/>
+                </a:lnSpc>
+                <a:buFontTx/>
+                <a:buChar char="-"/>
+              </a:pPr>
+              <a:endParaRPr lang="en-GB" sz="2400" dirty="0">
+                <a:solidFill>
+                  <a:schemeClr val="accent1">
+                    <a:lumMod val="50000"/>
+                  </a:schemeClr>
+                </a:solidFill>
+                <a:latin typeface="Comic Sans MS"/>
+              </a:endParaRPr>
+            </a:p>
+            <a:p>
+              <a:pPr marL="342900" indent="-342900" algn="ctr" defTabSz="914400">
+                <a:lnSpc>
+                  <a:spcPct val="150000"/>
+                </a:lnSpc>
+                <a:buFontTx/>
+                <a:buChar char="-"/>
+              </a:pPr>
+              <a:r>
+                <a:rPr lang="en-GB" sz="2400" dirty="0">
+                  <a:solidFill>
+                    <a:schemeClr val="accent1">
+                      <a:lumMod val="50000"/>
+                    </a:schemeClr>
+                  </a:solidFill>
+                  <a:latin typeface="Comic Sans MS"/>
+                </a:rPr>
+                <a:t>Big Pharma would be liable for injuries had their gene therapy product not been </a:t>
+              </a:r>
+              <a:r>
+                <a:rPr lang="en-GB" sz="2400" dirty="0" err="1">
+                  <a:solidFill>
+                    <a:schemeClr val="accent1">
+                      <a:lumMod val="50000"/>
+                    </a:schemeClr>
+                  </a:solidFill>
+                  <a:latin typeface="Comic Sans MS"/>
+                </a:rPr>
+                <a:t>labeled</a:t>
+              </a:r>
+              <a:r>
+                <a:rPr lang="en-GB" sz="2400" dirty="0">
+                  <a:solidFill>
+                    <a:schemeClr val="accent1">
+                      <a:lumMod val="50000"/>
+                    </a:schemeClr>
+                  </a:solidFill>
+                  <a:latin typeface="Comic Sans MS"/>
+                </a:rPr>
+                <a:t> "vaccines".</a:t>
+              </a:r>
+            </a:p>
+            <a:p>
+              <a:pPr algn="ctr" defTabSz="914400">
+                <a:lnSpc>
+                  <a:spcPct val="150000"/>
+                </a:lnSpc>
+              </a:pPr>
+              <a:endParaRPr lang="en-GB" sz="2400" dirty="0">
+                <a:solidFill>
+                  <a:schemeClr val="accent1">
+                    <a:lumMod val="50000"/>
+                  </a:schemeClr>
+                </a:solidFill>
+                <a:latin typeface="Comic Sans MS"/>
+              </a:endParaRPr>
+            </a:p>
+            <a:p>
+              <a:pPr algn="ctr" defTabSz="914400">
+                <a:lnSpc>
+                  <a:spcPct val="150000"/>
+                </a:lnSpc>
+              </a:pPr>
+              <a:r>
+                <a:rPr lang="en-GB" sz="2400" dirty="0">
+                  <a:solidFill>
+                    <a:schemeClr val="accent1">
+                      <a:lumMod val="50000"/>
+                    </a:schemeClr>
+                  </a:solidFill>
+                  <a:latin typeface="Comic Sans MS"/>
+                </a:rPr>
+                <a:t>- Big Pharma is regularly paying huge fines for all kinds of nefarious practices.</a:t>
+              </a:r>
+            </a:p>
+            <a:p>
+              <a:pPr algn="ctr" defTabSz="914400">
+                <a:lnSpc>
+                  <a:spcPct val="150000"/>
+                </a:lnSpc>
+              </a:pPr>
+              <a:r>
+                <a:rPr lang="en-GB" sz="2400" dirty="0">
+                  <a:solidFill>
+                    <a:schemeClr val="accent1">
+                      <a:lumMod val="50000"/>
+                    </a:schemeClr>
+                  </a:solidFill>
+                  <a:latin typeface="Comic Sans MS"/>
+                </a:rPr>
+                <a:t>- Government bodies such as the European </a:t>
+              </a:r>
+              <a:r>
+                <a:rPr lang="en-GB" sz="2400" dirty="0" err="1">
+                  <a:solidFill>
+                    <a:schemeClr val="accent1">
+                      <a:lumMod val="50000"/>
+                    </a:schemeClr>
+                  </a:solidFill>
+                  <a:latin typeface="Comic Sans MS"/>
+                </a:rPr>
+                <a:t>Comission</a:t>
+              </a:r>
+              <a:r>
+                <a:rPr lang="en-GB" sz="2400" dirty="0">
+                  <a:solidFill>
+                    <a:schemeClr val="accent1">
+                      <a:lumMod val="50000"/>
+                    </a:schemeClr>
+                  </a:solidFill>
+                  <a:latin typeface="Comic Sans MS"/>
+                </a:rPr>
+                <a:t> and the  US Food and drug administration have Big Pharma's back. </a:t>
+              </a:r>
+            </a:p>
+          </p:txBody>
+        </p:sp>
+      </p:grpSp>
+    </p:spTree>
+    <p:extLst>
+      <p:ext uri="{BB962C8B-B14F-4D97-AF65-F5344CB8AC3E}">
+        <p14:creationId xmlns:p14="http://schemas.microsoft.com/office/powerpoint/2010/main" val="2373524040"/>
+      </p:ext>
+    </p:extLst>
+  </p:cSld>
+  <p:clrMapOvr>
+    <a:masterClrMapping/>
+  </p:clrMapOvr>
+  <mc:AlternateContent xmlns:mc="http://schemas.openxmlformats.org/markup-compatibility/2006" xmlns:p14="http://schemas.microsoft.com/office/powerpoint/2010/main">
+    <mc:Choice Requires="p14">
+      <p:transition spd="med" p14:dur="700" advClick="0" advTm="35000">
+        <p:fade/>
+      </p:transition>
+    </mc:Choice>
+    <mc:Fallback xmlns="">
+      <p:transition spd="med" advClick="0" advTm="35000">
+        <p:fade/>
+      </p:transition>
+    </mc:Fallback>
+  </mc:AlternateContent>
+  <p:timing>
+    <p:tnLst>
+      <p:par>
+        <p:cTn id="1" dur="indefinite" restart="never" nodeType="tmRoot">
+          <p:childTnLst>
+            <p:seq concurrent="1" nextAc="seek">
+              <p:cTn id="2" dur="indefinite" nodeType="mainSeq">
+                <p:childTnLst>
+                  <p:par>
+                    <p:cTn id="3" fill="hold">
+                      <p:stCondLst>
+                        <p:cond delay="indefinite"/>
+                        <p:cond evt="onBegin" delay="0">
+                          <p:tn val="2"/>
+                        </p:cond>
+                      </p:stCondLst>
+                      <p:childTnLst>
+                        <p:par>
+                          <p:cTn id="4" fill="hold">
+                            <p:stCondLst>
+                              <p:cond delay="0"/>
+                            </p:stCondLst>
+                            <p:childTnLst>
+                              <p:par>
+                                <p:cTn id="5" presetID="10" presetClass="entr" presetSubtype="0" fill="hold" nodeType="afterEffect">
+                                  <p:stCondLst>
+                                    <p:cond delay="3000"/>
+                                  </p:stCondLst>
+                                  <p:childTnLst>
+                                    <p:set>
+                                      <p:cBhvr>
+                                        <p:cTn id="6" dur="1" fill="hold">
+                                          <p:stCondLst>
+                                            <p:cond delay="0"/>
+                                          </p:stCondLst>
+                                        </p:cTn>
+                                        <p:tgtEl>
+                                          <p:spTgt spid="5"/>
+                                        </p:tgtEl>
+                                        <p:attrNameLst>
+                                          <p:attrName>style.visibility</p:attrName>
+                                        </p:attrNameLst>
+                                      </p:cBhvr>
+                                      <p:to>
+                                        <p:strVal val="visible"/>
+                                      </p:to>
+                                    </p:set>
+                                    <p:animEffect transition="in" filter="fade">
+                                      <p:cBhvr>
+                                        <p:cTn id="7" dur="500"/>
+                                        <p:tgtEl>
+                                          <p:spTgt spid="5"/>
+                                        </p:tgtEl>
+                                      </p:cBhvr>
+                                    </p:animEffect>
+                                  </p:childTnLst>
+                                </p:cTn>
+                              </p:par>
+                            </p:childTnLst>
+                          </p:cTn>
+                        </p:par>
+                        <p:par>
+                          <p:cTn id="8" fill="hold">
+                            <p:stCondLst>
+                              <p:cond delay="3500"/>
+                            </p:stCondLst>
+                            <p:childTnLst>
+                              <p:par>
+                                <p:cTn id="9" presetID="10" presetClass="entr" presetSubtype="0" fill="hold" nodeType="afterEffect">
+                                  <p:stCondLst>
+                                    <p:cond delay="1300"/>
+                                  </p:stCondLst>
+                                  <p:childTnLst>
+                                    <p:set>
+                                      <p:cBhvr>
+                                        <p:cTn id="10" dur="1" fill="hold">
+                                          <p:stCondLst>
+                                            <p:cond delay="0"/>
+                                          </p:stCondLst>
+                                        </p:cTn>
+                                        <p:tgtEl>
+                                          <p:spTgt spid="14"/>
+                                        </p:tgtEl>
+                                        <p:attrNameLst>
+                                          <p:attrName>style.visibility</p:attrName>
+                                        </p:attrNameLst>
+                                      </p:cBhvr>
+                                      <p:to>
+                                        <p:strVal val="visible"/>
+                                      </p:to>
+                                    </p:set>
+                                    <p:animEffect transition="in" filter="fade">
+                                      <p:cBhvr>
+                                        <p:cTn id="11" dur="500"/>
+                                        <p:tgtEl>
+                                          <p:spTgt spid="14"/>
+                                        </p:tgtEl>
+                                      </p:cBhvr>
+                                    </p:animEffect>
+                                  </p:childTnLst>
+                                </p:cTn>
+                              </p:par>
+                            </p:childTnLst>
+                          </p:cTn>
+                        </p:par>
+                        <p:par>
+                          <p:cTn id="12" fill="hold">
+                            <p:stCondLst>
+                              <p:cond delay="5300"/>
+                            </p:stCondLst>
+                            <p:childTnLst>
+                              <p:par>
+                                <p:cTn id="13" presetID="10" presetClass="entr" presetSubtype="0" fill="hold" nodeType="afterEffect">
+                                  <p:stCondLst>
+                                    <p:cond delay="1400"/>
+                                  </p:stCondLst>
+                                  <p:childTnLst>
+                                    <p:set>
+                                      <p:cBhvr>
+                                        <p:cTn id="14" dur="1" fill="hold">
+                                          <p:stCondLst>
+                                            <p:cond delay="0"/>
+                                          </p:stCondLst>
+                                        </p:cTn>
+                                        <p:tgtEl>
+                                          <p:spTgt spid="18"/>
+                                        </p:tgtEl>
+                                        <p:attrNameLst>
+                                          <p:attrName>style.visibility</p:attrName>
+                                        </p:attrNameLst>
+                                      </p:cBhvr>
+                                      <p:to>
+                                        <p:strVal val="visible"/>
+                                      </p:to>
+                                    </p:set>
+                                    <p:animEffect transition="in" filter="fade">
+                                      <p:cBhvr>
+                                        <p:cTn id="15" dur="500"/>
+                                        <p:tgtEl>
+                                          <p:spTgt spid="18"/>
+                                        </p:tgtEl>
+                                      </p:cBhvr>
+                                    </p:animEffect>
+                                  </p:childTnLst>
+                                </p:cTn>
+                              </p:par>
+                            </p:childTnLst>
+                          </p:cTn>
+                        </p:par>
+                        <p:par>
+                          <p:cTn id="16" fill="hold">
+                            <p:stCondLst>
+                              <p:cond delay="7200"/>
+                            </p:stCondLst>
+                            <p:childTnLst>
+                              <p:par>
+                                <p:cTn id="17" presetID="10" presetClass="entr" presetSubtype="0" fill="hold" nodeType="afterEffect">
+                                  <p:stCondLst>
+                                    <p:cond delay="1300"/>
+                                  </p:stCondLst>
+                                  <p:childTnLst>
+                                    <p:set>
+                                      <p:cBhvr>
+                                        <p:cTn id="18" dur="1" fill="hold">
+                                          <p:stCondLst>
+                                            <p:cond delay="0"/>
+                                          </p:stCondLst>
+                                        </p:cTn>
+                                        <p:tgtEl>
+                                          <p:spTgt spid="19"/>
+                                        </p:tgtEl>
+                                        <p:attrNameLst>
+                                          <p:attrName>style.visibility</p:attrName>
+                                        </p:attrNameLst>
+                                      </p:cBhvr>
+                                      <p:to>
+                                        <p:strVal val="visible"/>
+                                      </p:to>
+                                    </p:set>
+                                    <p:animEffect transition="in" filter="fade">
+                                      <p:cBhvr>
+                                        <p:cTn id="19" dur="500"/>
+                                        <p:tgtEl>
+                                          <p:spTgt spid="19"/>
+                                        </p:tgtEl>
+                                      </p:cBhvr>
+                                    </p:animEffect>
+                                  </p:childTnLst>
+                                </p:cTn>
+                              </p:par>
+                            </p:childTnLst>
+                          </p:cTn>
+                        </p:par>
+                        <p:par>
+                          <p:cTn id="20" fill="hold">
+                            <p:stCondLst>
+                              <p:cond delay="9000"/>
+                            </p:stCondLst>
+                            <p:childTnLst>
+                              <p:par>
+                                <p:cTn id="21" presetID="2" presetClass="entr" presetSubtype="4" fill="hold" nodeType="afterEffect">
+                                  <p:stCondLst>
+                                    <p:cond delay="500"/>
+                                  </p:stCondLst>
+                                  <p:childTnLst>
+                                    <p:set>
+                                      <p:cBhvr>
+                                        <p:cTn id="22" dur="1" fill="hold">
+                                          <p:stCondLst>
+                                            <p:cond delay="0"/>
+                                          </p:stCondLst>
+                                        </p:cTn>
+                                        <p:tgtEl>
+                                          <p:spTgt spid="20"/>
+                                        </p:tgtEl>
+                                        <p:attrNameLst>
+                                          <p:attrName>style.visibility</p:attrName>
+                                        </p:attrNameLst>
+                                      </p:cBhvr>
+                                      <p:to>
+                                        <p:strVal val="visible"/>
+                                      </p:to>
+                                    </p:set>
+                                    <p:anim calcmode="lin" valueType="num">
+                                      <p:cBhvr additive="base">
+                                        <p:cTn id="23" dur="500" fill="hold"/>
+                                        <p:tgtEl>
+                                          <p:spTgt spid="20"/>
+                                        </p:tgtEl>
+                                        <p:attrNameLst>
+                                          <p:attrName>ppt_x</p:attrName>
+                                        </p:attrNameLst>
+                                      </p:cBhvr>
+                                      <p:tavLst>
+                                        <p:tav tm="0">
+                                          <p:val>
+                                            <p:strVal val="#ppt_x"/>
+                                          </p:val>
+                                        </p:tav>
+                                        <p:tav tm="100000">
+                                          <p:val>
+                                            <p:strVal val="#ppt_x"/>
+                                          </p:val>
+                                        </p:tav>
+                                      </p:tavLst>
+                                    </p:anim>
+                                    <p:anim calcmode="lin" valueType="num">
+                                      <p:cBhvr additive="base">
+                                        <p:cTn id="24" dur="500" fill="hold"/>
+                                        <p:tgtEl>
+                                          <p:spTgt spid="20"/>
+                                        </p:tgtEl>
+                                        <p:attrNameLst>
+                                          <p:attrName>ppt_y</p:attrName>
+                                        </p:attrNameLst>
+                                      </p:cBhvr>
+                                      <p:tavLst>
+                                        <p:tav tm="0">
+                                          <p:val>
+                                            <p:strVal val="1+#ppt_h/2"/>
+                                          </p:val>
+                                        </p:tav>
+                                        <p:tav tm="100000">
+                                          <p:val>
+                                            <p:strVal val="#ppt_y"/>
+                                          </p:val>
+                                        </p:tav>
+                                      </p:tavLst>
+                                    </p:anim>
                                   </p:childTnLst>
                                 </p:cTn>
                               </p:par>

</xml_diff>